<commit_message>
MVC Code and notes
</commit_message>
<xml_diff>
--- a/MVC/MVC_PPT.pptx
+++ b/MVC/MVC_PPT.pptx
@@ -5,12 +5,13 @@
     <p:sldMasterId id="2147483648" r:id="rId1"/>
   </p:sldMasterIdLst>
   <p:sldIdLst>
-    <p:sldId id="256" r:id="rId2"/>
-    <p:sldId id="257" r:id="rId3"/>
-    <p:sldId id="258" r:id="rId4"/>
-    <p:sldId id="259" r:id="rId5"/>
-    <p:sldId id="260" r:id="rId6"/>
-    <p:sldId id="261" r:id="rId7"/>
+    <p:sldId id="262" r:id="rId2"/>
+    <p:sldId id="256" r:id="rId3"/>
+    <p:sldId id="257" r:id="rId4"/>
+    <p:sldId id="258" r:id="rId5"/>
+    <p:sldId id="259" r:id="rId6"/>
+    <p:sldId id="260" r:id="rId7"/>
+    <p:sldId id="261" r:id="rId8"/>
   </p:sldIdLst>
   <p:sldSz cx="9144000" cy="6858000" type="screen4x3"/>
   <p:notesSz cx="6858000" cy="9144000"/>
@@ -3102,14 +3103,14 @@
       </p:grpSpPr>
       <p:sp>
         <p:nvSpPr>
-          <p:cNvPr id="5" name="Rectangle 4"/>
+          <p:cNvPr id="2" name="Rectangle 1"/>
           <p:cNvSpPr/>
           <p:nvPr/>
         </p:nvSpPr>
         <p:spPr>
           <a:xfrm>
-            <a:off x="228600" y="228600"/>
-            <a:ext cx="8610600" cy="6186309"/>
+            <a:off x="228600" y="304800"/>
+            <a:ext cx="8763000" cy="4524315"/>
           </a:xfrm>
           <a:prstGeom prst="rect">
             <a:avLst/>
@@ -3121,25 +3122,9 @@
           </a:bodyPr>
           <a:lstStyle/>
           <a:p>
-            <a:pPr marL="285750" indent="-285750">
-              <a:buFont typeface="Arial" panose="020B0604020202020204" pitchFamily="34" charset="0"/>
-              <a:buChar char="•"/>
-            </a:pPr>
             <a:r>
               <a:rPr lang="en-US" dirty="0"/>
-              <a:t>In ASP.NET MVC application, we can pass the model data from a controller to a view in many ways such as by using </a:t>
-            </a:r>
-            <a:r>
-              <a:rPr lang="en-US" dirty="0" smtClean="0"/>
-              <a:t>ViewBag, </a:t>
-            </a:r>
-            <a:r>
-              <a:rPr lang="en-US" dirty="0"/>
-              <a:t>ViewData, TempData</a:t>
-            </a:r>
-            <a:r>
-              <a:rPr lang="en-US" dirty="0" smtClean="0"/>
-              <a:t>.</a:t>
+              <a:t>In ASP.NET MVC application, we can pass the model data from a controller to a view in many ways such as by using ViewBag, ViewData, TempData.</a:t>
             </a:r>
           </a:p>
           <a:p>
@@ -3150,22 +3135,198 @@
             <a:endParaRPr lang="en-US" dirty="0"/>
           </a:p>
           <a:p>
-            <a:pPr marL="285750" indent="-285750">
-              <a:buFont typeface="Arial" panose="020B0604020202020204" pitchFamily="34" charset="0"/>
-              <a:buChar char="•"/>
-            </a:pPr>
+            <a:r>
+              <a:rPr lang="en-US" dirty="0"/>
+              <a:t>When to use ViewData, ViewBag, TempData?</a:t>
+            </a:r>
+          </a:p>
+          <a:p>
+            <a:pPr fontAlgn="base"/>
+            <a:endParaRPr lang="en-US" b="1" dirty="0" smtClean="0"/>
+          </a:p>
+          <a:p>
+            <a:pPr fontAlgn="base"/>
+            <a:r>
+              <a:rPr lang="en-US" b="1" dirty="0" smtClean="0"/>
+              <a:t>ViewBag </a:t>
+            </a:r>
+            <a:r>
+              <a:rPr lang="en-US" b="1" dirty="0"/>
+              <a:t>in ASP.NET MVC </a:t>
+            </a:r>
+            <a:r>
+              <a:rPr lang="en-US" b="1" dirty="0" smtClean="0"/>
+              <a:t>Application</a:t>
+            </a:r>
+          </a:p>
+          <a:p>
+            <a:pPr fontAlgn="base"/>
+            <a:endParaRPr lang="en-US" b="1" dirty="0"/>
+          </a:p>
+          <a:p>
+            <a:pPr fontAlgn="base"/>
+            <a:r>
+              <a:rPr lang="en-US" dirty="0"/>
+              <a:t>The ViewBag in MVC is one of the mechanisms to pass the data from a controller to a view</a:t>
+            </a:r>
             <a:r>
               <a:rPr lang="en-US" dirty="0" smtClean="0"/>
-              <a:t>When </a:t>
-            </a:r>
+              <a:t>.</a:t>
+            </a:r>
+          </a:p>
+          <a:p>
+            <a:pPr fontAlgn="base"/>
+            <a:endParaRPr lang="en-US" dirty="0" smtClean="0"/>
+          </a:p>
+          <a:p>
+            <a:pPr fontAlgn="base"/>
+            <a:r>
+              <a:rPr lang="en-US" b="1" dirty="0"/>
+              <a:t>How to Pass and Retrieve data From ViewBag in ASP.NET MVC?</a:t>
+            </a:r>
+            <a:endParaRPr lang="en-US" dirty="0"/>
+          </a:p>
+          <a:p>
+            <a:pPr fontAlgn="base"/>
             <a:r>
               <a:rPr lang="en-US" dirty="0"/>
-              <a:t>to use ViewData, ViewBag, </a:t>
-            </a:r>
-            <a:r>
-              <a:rPr lang="en-US" dirty="0" smtClean="0"/>
-              <a:t>TempData?</a:t>
-            </a:r>
+              <a:t>As the ViewBag is operating on the new dynamic data type. The advantage is that we do not require typecasting while accessing the data from a ViewBag irrespective of the data that we are accessing. </a:t>
+            </a:r>
+          </a:p>
+          <a:p>
+            <a:pPr fontAlgn="base"/>
+            <a:r>
+              <a:rPr lang="en-US" b="1" dirty="0"/>
+              <a:t>ViewBag in ASP.NET MVC with String Type</a:t>
+            </a:r>
+            <a:r>
+              <a:rPr lang="en-US" b="1" dirty="0" smtClean="0"/>
+              <a:t>:</a:t>
+            </a:r>
+          </a:p>
+          <a:p>
+            <a:pPr fontAlgn="base"/>
+            <a:endParaRPr lang="en-US" dirty="0"/>
+          </a:p>
+          <a:p>
+            <a:pPr fontAlgn="base"/>
+            <a:endParaRPr lang="en-US" dirty="0"/>
+          </a:p>
+        </p:txBody>
+      </p:sp>
+      <p:pic>
+        <p:nvPicPr>
+          <p:cNvPr id="1026" name="Picture 2"/>
+          <p:cNvPicPr>
+            <a:picLocks noChangeAspect="1" noChangeArrowheads="1"/>
+          </p:cNvPicPr>
+          <p:nvPr/>
+        </p:nvPicPr>
+        <p:blipFill>
+          <a:blip r:embed="rId2">
+            <a:extLst>
+              <a:ext uri="{28A0092B-C50C-407E-A947-70E740481C1C}">
+                <a14:useLocalDpi xmlns:a14="http://schemas.microsoft.com/office/drawing/2010/main" val="0"/>
+              </a:ext>
+            </a:extLst>
+          </a:blip>
+          <a:srcRect/>
+          <a:stretch>
+            <a:fillRect/>
+          </a:stretch>
+        </p:blipFill>
+        <p:spPr bwMode="auto">
+          <a:xfrm>
+            <a:off x="252984" y="4267200"/>
+            <a:ext cx="7040880" cy="2279827"/>
+          </a:xfrm>
+          <a:prstGeom prst="rect">
+            <a:avLst/>
+          </a:prstGeom>
+          <a:noFill/>
+          <a:ln>
+            <a:noFill/>
+          </a:ln>
+          <a:extLst>
+            <a:ext uri="{909E8E84-426E-40DD-AFC4-6F175D3DCCD1}">
+              <a14:hiddenFill xmlns:a14="http://schemas.microsoft.com/office/drawing/2010/main">
+                <a:solidFill>
+                  <a:schemeClr val="accent1"/>
+                </a:solidFill>
+              </a14:hiddenFill>
+            </a:ext>
+            <a:ext uri="{91240B29-F687-4F45-9708-019B960494DF}">
+              <a14:hiddenLine xmlns:a14="http://schemas.microsoft.com/office/drawing/2010/main" w="9525">
+                <a:solidFill>
+                  <a:schemeClr val="tx1"/>
+                </a:solidFill>
+                <a:miter lim="800000"/>
+                <a:headEnd/>
+                <a:tailEnd/>
+              </a14:hiddenLine>
+            </a:ext>
+          </a:extLst>
+        </p:spPr>
+      </p:pic>
+    </p:spTree>
+    <p:extLst>
+      <p:ext uri="{BB962C8B-B14F-4D97-AF65-F5344CB8AC3E}">
+        <p14:creationId xmlns:p14="http://schemas.microsoft.com/office/powerpoint/2010/main" val="2241673521"/>
+      </p:ext>
+    </p:extLst>
+  </p:cSld>
+  <p:clrMapOvr>
+    <a:masterClrMapping/>
+  </p:clrMapOvr>
+  <p:timing>
+    <p:tnLst>
+      <p:par>
+        <p:cTn id="1" dur="indefinite" restart="never" nodeType="tmRoot"/>
+      </p:par>
+    </p:tnLst>
+  </p:timing>
+</p:sld>
+</file>
+
+<file path=ppt/slides/slide2.xml><?xml version="1.0" encoding="utf-8"?>
+<p:sld xmlns:a="http://schemas.openxmlformats.org/drawingml/2006/main" xmlns:r="http://schemas.openxmlformats.org/officeDocument/2006/relationships" xmlns:p="http://schemas.openxmlformats.org/presentationml/2006/main">
+  <p:cSld>
+    <p:spTree>
+      <p:nvGrpSpPr>
+        <p:cNvPr id="1" name=""/>
+        <p:cNvGrpSpPr/>
+        <p:nvPr/>
+      </p:nvGrpSpPr>
+      <p:grpSpPr>
+        <a:xfrm>
+          <a:off x="0" y="0"/>
+          <a:ext cx="0" cy="0"/>
+          <a:chOff x="0" y="0"/>
+          <a:chExt cx="0" cy="0"/>
+        </a:xfrm>
+      </p:grpSpPr>
+      <p:sp>
+        <p:nvSpPr>
+          <p:cNvPr id="5" name="Rectangle 4"/>
+          <p:cNvSpPr/>
+          <p:nvPr/>
+        </p:nvSpPr>
+        <p:spPr>
+          <a:xfrm>
+            <a:off x="228600" y="228600"/>
+            <a:ext cx="8610600" cy="5355312"/>
+          </a:xfrm>
+          <a:prstGeom prst="rect">
+            <a:avLst/>
+          </a:prstGeom>
+        </p:spPr>
+        <p:txBody>
+          <a:bodyPr wrap="square">
+            <a:spAutoFit/>
+          </a:bodyPr>
+          <a:lstStyle/>
+          <a:p>
+            <a:endParaRPr lang="en-US" dirty="0" smtClean="0"/>
           </a:p>
           <a:p>
             <a:pPr fontAlgn="base"/>
@@ -3343,10 +3504,17 @@
   <p:clrMapOvr>
     <a:masterClrMapping/>
   </p:clrMapOvr>
+  <p:timing>
+    <p:tnLst>
+      <p:par>
+        <p:cTn id="1" dur="indefinite" restart="never" nodeType="tmRoot"/>
+      </p:par>
+    </p:tnLst>
+  </p:timing>
 </p:sld>
 </file>
 
-<file path=ppt/slides/slide2.xml><?xml version="1.0" encoding="utf-8"?>
+<file path=ppt/slides/slide3.xml><?xml version="1.0" encoding="utf-8"?>
 <p:sld xmlns:a="http://schemas.openxmlformats.org/drawingml/2006/main" xmlns:r="http://schemas.openxmlformats.org/officeDocument/2006/relationships" xmlns:p="http://schemas.openxmlformats.org/presentationml/2006/main">
   <p:cSld>
     <p:spTree>
@@ -3570,10 +3738,17 @@
   <p:clrMapOvr>
     <a:masterClrMapping/>
   </p:clrMapOvr>
+  <p:timing>
+    <p:tnLst>
+      <p:par>
+        <p:cTn id="1" dur="indefinite" restart="never" nodeType="tmRoot"/>
+      </p:par>
+    </p:tnLst>
+  </p:timing>
 </p:sld>
 </file>
 
-<file path=ppt/slides/slide3.xml><?xml version="1.0" encoding="utf-8"?>
+<file path=ppt/slides/slide4.xml><?xml version="1.0" encoding="utf-8"?>
 <p:sld xmlns:a="http://schemas.openxmlformats.org/drawingml/2006/main" xmlns:r="http://schemas.openxmlformats.org/officeDocument/2006/relationships" xmlns:p="http://schemas.openxmlformats.org/presentationml/2006/main">
   <p:cSld>
     <p:spTree>
@@ -3700,250 +3875,13 @@
   <p:clrMapOvr>
     <a:masterClrMapping/>
   </p:clrMapOvr>
-</p:sld>
-</file>
-
-<file path=ppt/slides/slide4.xml><?xml version="1.0" encoding="utf-8"?>
-<p:sld xmlns:a="http://schemas.openxmlformats.org/drawingml/2006/main" xmlns:r="http://schemas.openxmlformats.org/officeDocument/2006/relationships" xmlns:p="http://schemas.openxmlformats.org/presentationml/2006/main">
-  <p:cSld>
-    <p:spTree>
-      <p:nvGrpSpPr>
-        <p:cNvPr id="1" name=""/>
-        <p:cNvGrpSpPr/>
-        <p:nvPr/>
-      </p:nvGrpSpPr>
-      <p:grpSpPr>
-        <a:xfrm>
-          <a:off x="0" y="0"/>
-          <a:ext cx="0" cy="0"/>
-          <a:chOff x="0" y="0"/>
-          <a:chExt cx="0" cy="0"/>
-        </a:xfrm>
-      </p:grpSpPr>
-      <p:sp>
-        <p:nvSpPr>
-          <p:cNvPr id="2" name="Rectangle 1"/>
-          <p:cNvSpPr/>
-          <p:nvPr/>
-        </p:nvSpPr>
-        <p:spPr>
-          <a:xfrm>
-            <a:off x="228600" y="381000"/>
-            <a:ext cx="8382000" cy="4524315"/>
-          </a:xfrm>
-          <a:prstGeom prst="rect">
-            <a:avLst/>
-          </a:prstGeom>
-        </p:spPr>
-        <p:txBody>
-          <a:bodyPr wrap="square">
-            <a:spAutoFit/>
-          </a:bodyPr>
-          <a:lstStyle/>
-          <a:p>
-            <a:r>
-              <a:rPr lang="en-US" dirty="0"/>
-              <a:t>Then we modify the Index action method of Home Controller as shown below to retrieve the employee data from </a:t>
-            </a:r>
-            <a:r>
-              <a:rPr lang="en-US" dirty="0" err="1"/>
-              <a:t>EmployeeBusinesslayer</a:t>
-            </a:r>
-            <a:r>
-              <a:rPr lang="en-US" dirty="0"/>
-              <a:t> and store it in the Employee model</a:t>
-            </a:r>
-            <a:r>
-              <a:rPr lang="en-US" dirty="0" smtClean="0"/>
-              <a:t>.</a:t>
-            </a:r>
-          </a:p>
-          <a:p>
-            <a:endParaRPr lang="en-US" dirty="0"/>
-          </a:p>
-          <a:p>
-            <a:r>
-              <a:rPr lang="en-US" b="1" dirty="0"/>
-              <a:t>Passing ViewData From a Controller:</a:t>
-            </a:r>
-            <a:endParaRPr lang="en-US" dirty="0"/>
-          </a:p>
-          <a:p>
-            <a:endParaRPr lang="en-US" dirty="0" smtClean="0"/>
-          </a:p>
-          <a:p>
-            <a:endParaRPr lang="en-US" dirty="0"/>
-          </a:p>
-          <a:p>
-            <a:pPr fontAlgn="base"/>
-            <a:r>
-              <a:rPr lang="en-US" b="1" dirty="0"/>
-              <a:t>public</a:t>
-            </a:r>
-            <a:r>
-              <a:rPr lang="en-US" dirty="0"/>
-              <a:t> </a:t>
-            </a:r>
-            <a:r>
-              <a:rPr lang="en-US" dirty="0" err="1"/>
-              <a:t>ActionResult</a:t>
-            </a:r>
-            <a:r>
-              <a:rPr lang="en-US" dirty="0"/>
-              <a:t> Index</a:t>
-            </a:r>
-            <a:r>
-              <a:rPr lang="en-US" b="1" dirty="0"/>
-              <a:t>()</a:t>
-            </a:r>
-            <a:endParaRPr lang="en-US" dirty="0"/>
-          </a:p>
-          <a:p>
-            <a:pPr fontAlgn="base"/>
-            <a:r>
-              <a:rPr lang="en-US" b="1" dirty="0"/>
-              <a:t>{</a:t>
-            </a:r>
-            <a:endParaRPr lang="en-US" dirty="0"/>
-          </a:p>
-          <a:p>
-            <a:pPr fontAlgn="base"/>
-            <a:r>
-              <a:rPr lang="en-US" dirty="0" err="1"/>
-              <a:t>EmployeeBusinessLayer</a:t>
-            </a:r>
-            <a:r>
-              <a:rPr lang="en-US" dirty="0"/>
-              <a:t> </a:t>
-            </a:r>
-            <a:r>
-              <a:rPr lang="en-US" dirty="0" err="1"/>
-              <a:t>employeeBL</a:t>
-            </a:r>
-            <a:r>
-              <a:rPr lang="en-US" dirty="0"/>
-              <a:t> = new </a:t>
-            </a:r>
-            <a:r>
-              <a:rPr lang="en-US" dirty="0" err="1"/>
-              <a:t>EmployeeBusinessLayer</a:t>
-            </a:r>
-            <a:r>
-              <a:rPr lang="en-US" b="1" dirty="0"/>
-              <a:t>()</a:t>
-            </a:r>
-            <a:r>
-              <a:rPr lang="en-US" dirty="0"/>
-              <a:t>;</a:t>
-            </a:r>
-          </a:p>
-          <a:p>
-            <a:pPr fontAlgn="base"/>
-            <a:r>
-              <a:rPr lang="en-US" dirty="0"/>
-              <a:t>Employee </a:t>
-            </a:r>
-            <a:r>
-              <a:rPr lang="en-US" dirty="0" err="1"/>
-              <a:t>employee</a:t>
-            </a:r>
-            <a:r>
-              <a:rPr lang="en-US" dirty="0"/>
-              <a:t> = </a:t>
-            </a:r>
-            <a:r>
-              <a:rPr lang="en-US" dirty="0" err="1"/>
-              <a:t>employeeBL.GetEmployeeDetails</a:t>
-            </a:r>
-            <a:r>
-              <a:rPr lang="en-US" b="1" dirty="0"/>
-              <a:t>(</a:t>
-            </a:r>
-            <a:r>
-              <a:rPr lang="en-US" dirty="0"/>
-              <a:t>102</a:t>
-            </a:r>
-            <a:r>
-              <a:rPr lang="en-US" b="1" dirty="0"/>
-              <a:t>)</a:t>
-            </a:r>
-            <a:r>
-              <a:rPr lang="en-US" dirty="0"/>
-              <a:t>;</a:t>
-            </a:r>
-          </a:p>
-          <a:p>
-            <a:pPr fontAlgn="base"/>
-            <a:r>
-              <a:rPr lang="en-US" dirty="0"/>
-              <a:t>ViewData</a:t>
-            </a:r>
-            <a:r>
-              <a:rPr lang="en-US" b="1" dirty="0"/>
-              <a:t>[</a:t>
-            </a:r>
-            <a:r>
-              <a:rPr lang="en-US" dirty="0"/>
-              <a:t>"Employee"</a:t>
-            </a:r>
-            <a:r>
-              <a:rPr lang="en-US" b="1" dirty="0"/>
-              <a:t>]</a:t>
-            </a:r>
-            <a:r>
-              <a:rPr lang="en-US" dirty="0"/>
-              <a:t> = employee;</a:t>
-            </a:r>
-          </a:p>
-          <a:p>
-            <a:pPr fontAlgn="base"/>
-            <a:r>
-              <a:rPr lang="en-US" b="1" dirty="0" smtClean="0"/>
-              <a:t>return</a:t>
-            </a:r>
-            <a:r>
-              <a:rPr lang="en-US" dirty="0" smtClean="0"/>
-              <a:t> </a:t>
-            </a:r>
-            <a:r>
-              <a:rPr lang="en-US" dirty="0"/>
-              <a:t>View</a:t>
-            </a:r>
-            <a:r>
-              <a:rPr lang="en-US" b="1" dirty="0"/>
-              <a:t>()</a:t>
-            </a:r>
-            <a:r>
-              <a:rPr lang="en-US" dirty="0"/>
-              <a:t>;</a:t>
-            </a:r>
-          </a:p>
-          <a:p>
-            <a:pPr fontAlgn="base"/>
-            <a:r>
-              <a:rPr lang="en-US" b="1" dirty="0"/>
-              <a:t>}</a:t>
-            </a:r>
-            <a:endParaRPr lang="en-US" dirty="0"/>
-          </a:p>
-          <a:p>
-            <a:endParaRPr lang="en-US" dirty="0" smtClean="0"/>
-          </a:p>
-          <a:p>
-            <a:endParaRPr lang="en-US" dirty="0"/>
-          </a:p>
-        </p:txBody>
-      </p:sp>
-    </p:spTree>
-    <p:extLst>
-      <p:ext uri="{BB962C8B-B14F-4D97-AF65-F5344CB8AC3E}">
-        <p14:creationId xmlns:p14="http://schemas.microsoft.com/office/powerpoint/2010/main" val="2230689955"/>
-      </p:ext>
-    </p:extLst>
-  </p:cSld>
-  <p:clrMapOvr>
-    <a:masterClrMapping/>
-  </p:clrMapOvr>
+  <p:timing>
+    <p:tnLst>
+      <p:par>
+        <p:cTn id="1" dur="indefinite" restart="never" nodeType="tmRoot"/>
+      </p:par>
+    </p:tnLst>
+  </p:timing>
 </p:sld>
 </file>
 
@@ -3972,6 +3910,257 @@
         </p:nvSpPr>
         <p:spPr>
           <a:xfrm>
+            <a:off x="228600" y="381000"/>
+            <a:ext cx="8382000" cy="4524315"/>
+          </a:xfrm>
+          <a:prstGeom prst="rect">
+            <a:avLst/>
+          </a:prstGeom>
+        </p:spPr>
+        <p:txBody>
+          <a:bodyPr wrap="square">
+            <a:spAutoFit/>
+          </a:bodyPr>
+          <a:lstStyle/>
+          <a:p>
+            <a:r>
+              <a:rPr lang="en-US" dirty="0"/>
+              <a:t>Then we modify the Index action method of Home Controller as shown below to retrieve the employee data from </a:t>
+            </a:r>
+            <a:r>
+              <a:rPr lang="en-US" dirty="0" err="1"/>
+              <a:t>EmployeeBusinesslayer</a:t>
+            </a:r>
+            <a:r>
+              <a:rPr lang="en-US" dirty="0"/>
+              <a:t> and store it in the Employee model</a:t>
+            </a:r>
+            <a:r>
+              <a:rPr lang="en-US" dirty="0" smtClean="0"/>
+              <a:t>.</a:t>
+            </a:r>
+          </a:p>
+          <a:p>
+            <a:endParaRPr lang="en-US" dirty="0"/>
+          </a:p>
+          <a:p>
+            <a:r>
+              <a:rPr lang="en-US" b="1" dirty="0"/>
+              <a:t>Passing ViewData From a Controller:</a:t>
+            </a:r>
+            <a:endParaRPr lang="en-US" dirty="0"/>
+          </a:p>
+          <a:p>
+            <a:endParaRPr lang="en-US" dirty="0" smtClean="0"/>
+          </a:p>
+          <a:p>
+            <a:endParaRPr lang="en-US" dirty="0"/>
+          </a:p>
+          <a:p>
+            <a:pPr fontAlgn="base"/>
+            <a:r>
+              <a:rPr lang="en-US" b="1" dirty="0"/>
+              <a:t>public</a:t>
+            </a:r>
+            <a:r>
+              <a:rPr lang="en-US" dirty="0"/>
+              <a:t> </a:t>
+            </a:r>
+            <a:r>
+              <a:rPr lang="en-US" dirty="0" err="1"/>
+              <a:t>ActionResult</a:t>
+            </a:r>
+            <a:r>
+              <a:rPr lang="en-US" dirty="0"/>
+              <a:t> Index</a:t>
+            </a:r>
+            <a:r>
+              <a:rPr lang="en-US" b="1" dirty="0"/>
+              <a:t>()</a:t>
+            </a:r>
+            <a:endParaRPr lang="en-US" dirty="0"/>
+          </a:p>
+          <a:p>
+            <a:pPr fontAlgn="base"/>
+            <a:r>
+              <a:rPr lang="en-US" b="1" dirty="0"/>
+              <a:t>{</a:t>
+            </a:r>
+            <a:endParaRPr lang="en-US" dirty="0"/>
+          </a:p>
+          <a:p>
+            <a:pPr fontAlgn="base"/>
+            <a:r>
+              <a:rPr lang="en-US" dirty="0" err="1"/>
+              <a:t>EmployeeBusinessLayer</a:t>
+            </a:r>
+            <a:r>
+              <a:rPr lang="en-US" dirty="0"/>
+              <a:t> </a:t>
+            </a:r>
+            <a:r>
+              <a:rPr lang="en-US" dirty="0" err="1"/>
+              <a:t>employeeBL</a:t>
+            </a:r>
+            <a:r>
+              <a:rPr lang="en-US" dirty="0"/>
+              <a:t> = new </a:t>
+            </a:r>
+            <a:r>
+              <a:rPr lang="en-US" dirty="0" err="1"/>
+              <a:t>EmployeeBusinessLayer</a:t>
+            </a:r>
+            <a:r>
+              <a:rPr lang="en-US" b="1" dirty="0"/>
+              <a:t>()</a:t>
+            </a:r>
+            <a:r>
+              <a:rPr lang="en-US" dirty="0"/>
+              <a:t>;</a:t>
+            </a:r>
+          </a:p>
+          <a:p>
+            <a:pPr fontAlgn="base"/>
+            <a:r>
+              <a:rPr lang="en-US" dirty="0"/>
+              <a:t>Employee </a:t>
+            </a:r>
+            <a:r>
+              <a:rPr lang="en-US" dirty="0" err="1"/>
+              <a:t>employee</a:t>
+            </a:r>
+            <a:r>
+              <a:rPr lang="en-US" dirty="0"/>
+              <a:t> = </a:t>
+            </a:r>
+            <a:r>
+              <a:rPr lang="en-US" dirty="0" err="1"/>
+              <a:t>employeeBL.GetEmployeeDetails</a:t>
+            </a:r>
+            <a:r>
+              <a:rPr lang="en-US" b="1" dirty="0"/>
+              <a:t>(</a:t>
+            </a:r>
+            <a:r>
+              <a:rPr lang="en-US" dirty="0"/>
+              <a:t>102</a:t>
+            </a:r>
+            <a:r>
+              <a:rPr lang="en-US" b="1" dirty="0"/>
+              <a:t>)</a:t>
+            </a:r>
+            <a:r>
+              <a:rPr lang="en-US" dirty="0"/>
+              <a:t>;</a:t>
+            </a:r>
+          </a:p>
+          <a:p>
+            <a:pPr fontAlgn="base"/>
+            <a:r>
+              <a:rPr lang="en-US" dirty="0"/>
+              <a:t>ViewData</a:t>
+            </a:r>
+            <a:r>
+              <a:rPr lang="en-US" b="1" dirty="0"/>
+              <a:t>[</a:t>
+            </a:r>
+            <a:r>
+              <a:rPr lang="en-US" dirty="0"/>
+              <a:t>"Employee"</a:t>
+            </a:r>
+            <a:r>
+              <a:rPr lang="en-US" b="1" dirty="0"/>
+              <a:t>]</a:t>
+            </a:r>
+            <a:r>
+              <a:rPr lang="en-US" dirty="0"/>
+              <a:t> = employee;</a:t>
+            </a:r>
+          </a:p>
+          <a:p>
+            <a:pPr fontAlgn="base"/>
+            <a:r>
+              <a:rPr lang="en-US" b="1" dirty="0" smtClean="0"/>
+              <a:t>return</a:t>
+            </a:r>
+            <a:r>
+              <a:rPr lang="en-US" dirty="0" smtClean="0"/>
+              <a:t> </a:t>
+            </a:r>
+            <a:r>
+              <a:rPr lang="en-US" dirty="0"/>
+              <a:t>View</a:t>
+            </a:r>
+            <a:r>
+              <a:rPr lang="en-US" b="1" dirty="0"/>
+              <a:t>()</a:t>
+            </a:r>
+            <a:r>
+              <a:rPr lang="en-US" dirty="0"/>
+              <a:t>;</a:t>
+            </a:r>
+          </a:p>
+          <a:p>
+            <a:pPr fontAlgn="base"/>
+            <a:r>
+              <a:rPr lang="en-US" b="1" dirty="0"/>
+              <a:t>}</a:t>
+            </a:r>
+            <a:endParaRPr lang="en-US" dirty="0"/>
+          </a:p>
+          <a:p>
+            <a:endParaRPr lang="en-US" dirty="0" smtClean="0"/>
+          </a:p>
+          <a:p>
+            <a:endParaRPr lang="en-US" dirty="0"/>
+          </a:p>
+        </p:txBody>
+      </p:sp>
+    </p:spTree>
+    <p:extLst>
+      <p:ext uri="{BB962C8B-B14F-4D97-AF65-F5344CB8AC3E}">
+        <p14:creationId xmlns:p14="http://schemas.microsoft.com/office/powerpoint/2010/main" val="2230689955"/>
+      </p:ext>
+    </p:extLst>
+  </p:cSld>
+  <p:clrMapOvr>
+    <a:masterClrMapping/>
+  </p:clrMapOvr>
+  <p:timing>
+    <p:tnLst>
+      <p:par>
+        <p:cTn id="1" dur="indefinite" restart="never" nodeType="tmRoot"/>
+      </p:par>
+    </p:tnLst>
+  </p:timing>
+</p:sld>
+</file>
+
+<file path=ppt/slides/slide6.xml><?xml version="1.0" encoding="utf-8"?>
+<p:sld xmlns:a="http://schemas.openxmlformats.org/drawingml/2006/main" xmlns:r="http://schemas.openxmlformats.org/officeDocument/2006/relationships" xmlns:p="http://schemas.openxmlformats.org/presentationml/2006/main">
+  <p:cSld>
+    <p:spTree>
+      <p:nvGrpSpPr>
+        <p:cNvPr id="1" name=""/>
+        <p:cNvGrpSpPr/>
+        <p:nvPr/>
+      </p:nvGrpSpPr>
+      <p:grpSpPr>
+        <a:xfrm>
+          <a:off x="0" y="0"/>
+          <a:ext cx="0" cy="0"/>
+          <a:chOff x="0" y="0"/>
+          <a:chExt cx="0" cy="0"/>
+        </a:xfrm>
+      </p:grpSpPr>
+      <p:sp>
+        <p:nvSpPr>
+          <p:cNvPr id="2" name="Rectangle 1"/>
+          <p:cNvSpPr/>
+          <p:nvPr/>
+        </p:nvSpPr>
+        <p:spPr>
+          <a:xfrm>
             <a:off x="381001" y="381000"/>
             <a:ext cx="8534400" cy="5632311"/>
           </a:xfrm>
@@ -4245,10 +4434,17 @@
   <p:clrMapOvr>
     <a:masterClrMapping/>
   </p:clrMapOvr>
+  <p:timing>
+    <p:tnLst>
+      <p:par>
+        <p:cTn id="1" dur="indefinite" restart="never" nodeType="tmRoot"/>
+      </p:par>
+    </p:tnLst>
+  </p:timing>
 </p:sld>
 </file>
 
-<file path=ppt/slides/slide6.xml><?xml version="1.0" encoding="utf-8"?>
+<file path=ppt/slides/slide7.xml><?xml version="1.0" encoding="utf-8"?>
 <p:sld xmlns:a="http://schemas.openxmlformats.org/drawingml/2006/main" xmlns:r="http://schemas.openxmlformats.org/officeDocument/2006/relationships" xmlns:p="http://schemas.openxmlformats.org/presentationml/2006/main">
   <p:cSld>
     <p:spTree>
@@ -4410,6 +4606,13 @@
   <p:clrMapOvr>
     <a:masterClrMapping/>
   </p:clrMapOvr>
+  <p:timing>
+    <p:tnLst>
+      <p:par>
+        <p:cTn id="1" dur="indefinite" restart="never" nodeType="tmRoot"/>
+      </p:par>
+    </p:tnLst>
+  </p:timing>
 </p:sld>
 </file>
 

</xml_diff>